<commit_message>
ceci est un commit
</commit_message>
<xml_diff>
--- a/Project/Oral/Project_Presentation.pptx
+++ b/Project/Oral/Project_Presentation.pptx
@@ -111,6 +111,11 @@
       </a:defRPr>
     </a:lvl9pPr>
   </p:defaultTextStyle>
+  <p:extLst>
+    <p:ext uri="{EFAFB233-063F-42B5-8137-9DF3F51BA10A}">
+      <p15:sldGuideLst xmlns:p15="http://schemas.microsoft.com/office/powerpoint/2012/main"/>
+    </p:ext>
+  </p:extLst>
 </p:presentation>
 </file>
 
@@ -340,7 +345,7 @@
           <a:p>
             <a:fld id="{7593EC6E-514C-495B-A7DF-C5B8ED9B003E}" type="datetimeFigureOut">
               <a:rPr lang="en-GB" smtClean="0"/>
-              <a:t>10/01/2019</a:t>
+              <a:t>15/01/2019</a:t>
             </a:fld>
             <a:endParaRPr lang="en-GB"/>
           </a:p>
@@ -382,7 +387,7 @@
           <a:p>
             <a:fld id="{3322C10A-B39E-46C3-8102-A05337FE2510}" type="slidenum">
               <a:rPr lang="en-GB" smtClean="0"/>
-              <a:t>‹N°›</a:t>
+              <a:t>‹#›</a:t>
             </a:fld>
             <a:endParaRPr lang="en-GB"/>
           </a:p>
@@ -548,7 +553,7 @@
           <a:p>
             <a:fld id="{7593EC6E-514C-495B-A7DF-C5B8ED9B003E}" type="datetimeFigureOut">
               <a:rPr lang="en-GB" smtClean="0"/>
-              <a:t>10/01/2019</a:t>
+              <a:t>15/01/2019</a:t>
             </a:fld>
             <a:endParaRPr lang="en-GB"/>
           </a:p>
@@ -590,7 +595,7 @@
           <a:p>
             <a:fld id="{3322C10A-B39E-46C3-8102-A05337FE2510}" type="slidenum">
               <a:rPr lang="en-GB" smtClean="0"/>
-              <a:t>‹N°›</a:t>
+              <a:t>‹#›</a:t>
             </a:fld>
             <a:endParaRPr lang="en-GB"/>
           </a:p>
@@ -804,7 +809,7 @@
           <a:p>
             <a:fld id="{7593EC6E-514C-495B-A7DF-C5B8ED9B003E}" type="datetimeFigureOut">
               <a:rPr lang="en-GB" smtClean="0"/>
-              <a:t>10/01/2019</a:t>
+              <a:t>15/01/2019</a:t>
             </a:fld>
             <a:endParaRPr lang="en-GB"/>
           </a:p>
@@ -846,7 +851,7 @@
           <a:p>
             <a:fld id="{3322C10A-B39E-46C3-8102-A05337FE2510}" type="slidenum">
               <a:rPr lang="en-GB" smtClean="0"/>
-              <a:t>‹N°›</a:t>
+              <a:t>‹#›</a:t>
             </a:fld>
             <a:endParaRPr lang="en-GB"/>
           </a:p>
@@ -974,7 +979,7 @@
           <a:p>
             <a:fld id="{7593EC6E-514C-495B-A7DF-C5B8ED9B003E}" type="datetimeFigureOut">
               <a:rPr lang="en-GB" smtClean="0"/>
-              <a:t>10/01/2019</a:t>
+              <a:t>15/01/2019</a:t>
             </a:fld>
             <a:endParaRPr lang="en-GB"/>
           </a:p>
@@ -1016,7 +1021,7 @@
           <a:p>
             <a:fld id="{3322C10A-B39E-46C3-8102-A05337FE2510}" type="slidenum">
               <a:rPr lang="en-GB" smtClean="0"/>
-              <a:t>‹N°›</a:t>
+              <a:t>‹#›</a:t>
             </a:fld>
             <a:endParaRPr lang="en-GB"/>
           </a:p>
@@ -1317,7 +1322,7 @@
           <a:p>
             <a:fld id="{7593EC6E-514C-495B-A7DF-C5B8ED9B003E}" type="datetimeFigureOut">
               <a:rPr lang="en-GB" smtClean="0"/>
-              <a:t>10/01/2019</a:t>
+              <a:t>15/01/2019</a:t>
             </a:fld>
             <a:endParaRPr lang="en-GB"/>
           </a:p>
@@ -1359,7 +1364,7 @@
           <a:p>
             <a:fld id="{3322C10A-B39E-46C3-8102-A05337FE2510}" type="slidenum">
               <a:rPr lang="en-GB" smtClean="0"/>
-              <a:t>‹N°›</a:t>
+              <a:t>‹#›</a:t>
             </a:fld>
             <a:endParaRPr lang="en-GB"/>
           </a:p>
@@ -1592,7 +1597,7 @@
           <a:p>
             <a:fld id="{7593EC6E-514C-495B-A7DF-C5B8ED9B003E}" type="datetimeFigureOut">
               <a:rPr lang="en-GB" smtClean="0"/>
-              <a:t>10/01/2019</a:t>
+              <a:t>15/01/2019</a:t>
             </a:fld>
             <a:endParaRPr lang="en-GB"/>
           </a:p>
@@ -1634,7 +1639,7 @@
           <a:p>
             <a:fld id="{3322C10A-B39E-46C3-8102-A05337FE2510}" type="slidenum">
               <a:rPr lang="en-GB" smtClean="0"/>
-              <a:t>‹N°›</a:t>
+              <a:t>‹#›</a:t>
             </a:fld>
             <a:endParaRPr lang="en-GB"/>
           </a:p>
@@ -1971,7 +1976,7 @@
           <a:p>
             <a:fld id="{7593EC6E-514C-495B-A7DF-C5B8ED9B003E}" type="datetimeFigureOut">
               <a:rPr lang="en-GB" smtClean="0"/>
-              <a:t>10/01/2019</a:t>
+              <a:t>15/01/2019</a:t>
             </a:fld>
             <a:endParaRPr lang="en-GB"/>
           </a:p>
@@ -2013,7 +2018,7 @@
           <a:p>
             <a:fld id="{3322C10A-B39E-46C3-8102-A05337FE2510}" type="slidenum">
               <a:rPr lang="en-GB" smtClean="0"/>
-              <a:t>‹N°›</a:t>
+              <a:t>‹#›</a:t>
             </a:fld>
             <a:endParaRPr lang="en-GB"/>
           </a:p>
@@ -2089,7 +2094,7 @@
           <a:p>
             <a:fld id="{7593EC6E-514C-495B-A7DF-C5B8ED9B003E}" type="datetimeFigureOut">
               <a:rPr lang="en-GB" smtClean="0"/>
-              <a:t>10/01/2019</a:t>
+              <a:t>15/01/2019</a:t>
             </a:fld>
             <a:endParaRPr lang="en-GB"/>
           </a:p>
@@ -2131,7 +2136,7 @@
           <a:p>
             <a:fld id="{3322C10A-B39E-46C3-8102-A05337FE2510}" type="slidenum">
               <a:rPr lang="en-GB" smtClean="0"/>
-              <a:t>‹N°›</a:t>
+              <a:t>‹#›</a:t>
             </a:fld>
             <a:endParaRPr lang="en-GB"/>
           </a:p>
@@ -2260,7 +2265,7 @@
           <a:p>
             <a:fld id="{7593EC6E-514C-495B-A7DF-C5B8ED9B003E}" type="datetimeFigureOut">
               <a:rPr lang="en-GB" smtClean="0"/>
-              <a:t>10/01/2019</a:t>
+              <a:t>15/01/2019</a:t>
             </a:fld>
             <a:endParaRPr lang="en-GB"/>
           </a:p>
@@ -2310,7 +2315,7 @@
           <a:p>
             <a:fld id="{3322C10A-B39E-46C3-8102-A05337FE2510}" type="slidenum">
               <a:rPr lang="en-GB" smtClean="0"/>
-              <a:t>‹N°›</a:t>
+              <a:t>‹#›</a:t>
             </a:fld>
             <a:endParaRPr lang="en-GB"/>
           </a:p>
@@ -2614,7 +2619,7 @@
           <a:p>
             <a:fld id="{7593EC6E-514C-495B-A7DF-C5B8ED9B003E}" type="datetimeFigureOut">
               <a:rPr lang="en-GB" smtClean="0"/>
-              <a:t>10/01/2019</a:t>
+              <a:t>15/01/2019</a:t>
             </a:fld>
             <a:endParaRPr lang="en-GB"/>
           </a:p>
@@ -2677,7 +2682,7 @@
           <a:p>
             <a:fld id="{3322C10A-B39E-46C3-8102-A05337FE2510}" type="slidenum">
               <a:rPr lang="en-GB" smtClean="0"/>
-              <a:t>‹N°›</a:t>
+              <a:t>‹#›</a:t>
             </a:fld>
             <a:endParaRPr lang="en-GB"/>
           </a:p>
@@ -2991,7 +2996,7 @@
           <a:p>
             <a:fld id="{7593EC6E-514C-495B-A7DF-C5B8ED9B003E}" type="datetimeFigureOut">
               <a:rPr lang="en-GB" smtClean="0"/>
-              <a:t>10/01/2019</a:t>
+              <a:t>15/01/2019</a:t>
             </a:fld>
             <a:endParaRPr lang="en-GB"/>
           </a:p>
@@ -3033,7 +3038,7 @@
           <a:p>
             <a:fld id="{3322C10A-B39E-46C3-8102-A05337FE2510}" type="slidenum">
               <a:rPr lang="en-GB" smtClean="0"/>
-              <a:t>‹N°›</a:t>
+              <a:t>‹#›</a:t>
             </a:fld>
             <a:endParaRPr lang="en-GB"/>
           </a:p>
@@ -3278,7 +3283,7 @@
           <a:p>
             <a:fld id="{7593EC6E-514C-495B-A7DF-C5B8ED9B003E}" type="datetimeFigureOut">
               <a:rPr lang="en-GB" smtClean="0"/>
-              <a:t>10/01/2019</a:t>
+              <a:t>15/01/2019</a:t>
             </a:fld>
             <a:endParaRPr lang="en-GB"/>
           </a:p>
@@ -3352,7 +3357,7 @@
           <a:p>
             <a:fld id="{3322C10A-B39E-46C3-8102-A05337FE2510}" type="slidenum">
               <a:rPr lang="en-GB" smtClean="0"/>
-              <a:t>‹N°›</a:t>
+              <a:t>‹#›</a:t>
             </a:fld>
             <a:endParaRPr lang="en-GB"/>
           </a:p>
@@ -3853,7 +3858,7 @@
           <a:p>
             <a:r>
               <a:rPr lang="en-GB" dirty="0"/>
-              <a:t>Free Music Alternative Playlist</a:t>
+              <a:t>Free Music Alternative Playlists</a:t>
             </a:r>
           </a:p>
         </p:txBody>
@@ -3934,13 +3939,130 @@
         </p:nvSpPr>
         <p:spPr/>
         <p:txBody>
-          <a:bodyPr/>
-          <a:lstStyle/>
-          <a:p>
-            <a:endParaRPr lang="en-GB" dirty="0"/>
-          </a:p>
-        </p:txBody>
-      </p:sp>
+          <a:bodyPr>
+            <a:normAutofit/>
+          </a:bodyPr>
+          <a:lstStyle/>
+          <a:p>
+            <a:pPr marL="0" indent="0">
+              <a:buNone/>
+            </a:pPr>
+            <a:endParaRPr lang="en-GB" sz="1800" dirty="0"/>
+          </a:p>
+          <a:p>
+            <a:pPr>
+              <a:buFont typeface="Arial" panose="020B0604020202020204" pitchFamily="34" charset="0"/>
+              <a:buChar char="•"/>
+            </a:pPr>
+            <a:r>
+              <a:rPr lang="en-GB" sz="2800" dirty="0"/>
+              <a:t> Distance calculation</a:t>
+            </a:r>
+          </a:p>
+          <a:p>
+            <a:pPr lvl="3">
+              <a:buFont typeface="Arial" panose="020B0604020202020204" pitchFamily="34" charset="0"/>
+              <a:buChar char="•"/>
+            </a:pPr>
+            <a:r>
+              <a:rPr lang="en-GB" sz="2200" dirty="0"/>
+              <a:t> Normalization</a:t>
+            </a:r>
+          </a:p>
+          <a:p>
+            <a:pPr lvl="3">
+              <a:buFont typeface="Arial" panose="020B0604020202020204" pitchFamily="34" charset="0"/>
+              <a:buChar char="•"/>
+            </a:pPr>
+            <a:r>
+              <a:rPr lang="en-GB" sz="2200" dirty="0"/>
+              <a:t> Type of distance : Euclidean</a:t>
+            </a:r>
+          </a:p>
+          <a:p>
+            <a:pPr>
+              <a:buFont typeface="Arial" panose="020B0604020202020204" pitchFamily="34" charset="0"/>
+              <a:buChar char="•"/>
+            </a:pPr>
+            <a:r>
+              <a:rPr lang="en-GB" sz="2800" dirty="0"/>
+              <a:t> Spring layout</a:t>
+            </a:r>
+          </a:p>
+          <a:p>
+            <a:pPr lvl="3">
+              <a:buFont typeface="Arial" panose="020B0604020202020204" pitchFamily="34" charset="0"/>
+              <a:buChar char="•"/>
+            </a:pPr>
+            <a:r>
+              <a:rPr lang="en-GB" sz="2200" dirty="0"/>
+              <a:t> 2 dimensions</a:t>
+            </a:r>
+          </a:p>
+          <a:p>
+            <a:pPr>
+              <a:buFont typeface="Arial" panose="020B0604020202020204" pitchFamily="34" charset="0"/>
+              <a:buChar char="•"/>
+            </a:pPr>
+            <a:r>
+              <a:rPr lang="en-GB" sz="2800" dirty="0"/>
+              <a:t> 3 genres kept</a:t>
+            </a:r>
+          </a:p>
+          <a:p>
+            <a:pPr lvl="3">
+              <a:buFont typeface="Arial" panose="020B0604020202020204" pitchFamily="34" charset="0"/>
+              <a:buChar char="•"/>
+            </a:pPr>
+            <a:r>
+              <a:rPr lang="en-GB" sz="2200" dirty="0"/>
+              <a:t>Rock, Hip-Hop, Folk </a:t>
+            </a:r>
+          </a:p>
+          <a:p>
+            <a:pPr marL="566928" lvl="3" indent="0">
+              <a:buNone/>
+            </a:pPr>
+            <a:endParaRPr lang="en-GB" sz="2200" dirty="0"/>
+          </a:p>
+        </p:txBody>
+      </p:sp>
+      <p:pic>
+        <p:nvPicPr>
+          <p:cNvPr id="5" name="Picture 4">
+            <a:extLst>
+              <a:ext uri="{FF2B5EF4-FFF2-40B4-BE49-F238E27FC236}">
+                <a16:creationId xmlns:a16="http://schemas.microsoft.com/office/drawing/2014/main" id="{2460308A-EFA6-4FB1-B891-E8F86CA062E3}"/>
+              </a:ext>
+            </a:extLst>
+          </p:cNvPr>
+          <p:cNvPicPr>
+            <a:picLocks noChangeAspect="1"/>
+          </p:cNvPicPr>
+          <p:nvPr/>
+        </p:nvPicPr>
+        <p:blipFill>
+          <a:blip r:embed="rId2">
+            <a:extLst>
+              <a:ext uri="{28A0092B-C50C-407E-A947-70E740481C1C}">
+                <a14:useLocalDpi xmlns:a14="http://schemas.microsoft.com/office/drawing/2010/main" val="0"/>
+              </a:ext>
+            </a:extLst>
+          </a:blip>
+          <a:stretch>
+            <a:fillRect/>
+          </a:stretch>
+        </p:blipFill>
+        <p:spPr>
+          <a:xfrm>
+            <a:off x="6126480" y="2029628"/>
+            <a:ext cx="5284480" cy="3655572"/>
+          </a:xfrm>
+          <a:prstGeom prst="rect">
+            <a:avLst/>
+          </a:prstGeom>
+        </p:spPr>
+      </p:pic>
     </p:spTree>
     <p:extLst>
       <p:ext uri="{BB962C8B-B14F-4D97-AF65-F5344CB8AC3E}">
@@ -3994,7 +4116,7 @@
           <a:p>
             <a:r>
               <a:rPr lang="en-GB" dirty="0"/>
-              <a:t>Including our songs</a:t>
+              <a:t>Including our Songs</a:t>
             </a:r>
           </a:p>
         </p:txBody>
@@ -4017,13 +4139,73 @@
         </p:nvSpPr>
         <p:spPr/>
         <p:txBody>
-          <a:bodyPr/>
-          <a:lstStyle/>
-          <a:p>
-            <a:endParaRPr lang="en-GB"/>
-          </a:p>
-        </p:txBody>
-      </p:sp>
+          <a:bodyPr>
+            <a:normAutofit/>
+          </a:bodyPr>
+          <a:lstStyle/>
+          <a:p>
+            <a:pPr>
+              <a:buFont typeface="Arial" panose="020B0604020202020204" pitchFamily="34" charset="0"/>
+              <a:buChar char="•"/>
+            </a:pPr>
+            <a:r>
+              <a:rPr lang="en-GB" sz="2800" dirty="0"/>
+              <a:t> </a:t>
+            </a:r>
+            <a:r>
+              <a:rPr lang="en-GB" sz="2800" dirty="0" err="1"/>
+              <a:t>Recomputation</a:t>
+            </a:r>
+            <a:endParaRPr lang="en-GB" sz="2800" dirty="0"/>
+          </a:p>
+          <a:p>
+            <a:pPr>
+              <a:buFont typeface="Arial" panose="020B0604020202020204" pitchFamily="34" charset="0"/>
+              <a:buChar char="•"/>
+            </a:pPr>
+            <a:r>
+              <a:rPr lang="en-GB" sz="2800" dirty="0"/>
+              <a:t> Placement using a K-D tree</a:t>
+            </a:r>
+          </a:p>
+        </p:txBody>
+      </p:sp>
+      <p:pic>
+        <p:nvPicPr>
+          <p:cNvPr id="5" name="Picture 4">
+            <a:extLst>
+              <a:ext uri="{FF2B5EF4-FFF2-40B4-BE49-F238E27FC236}">
+                <a16:creationId xmlns:a16="http://schemas.microsoft.com/office/drawing/2014/main" id="{A0E645F1-3426-4F65-900F-B4C8397F724B}"/>
+              </a:ext>
+            </a:extLst>
+          </p:cNvPr>
+          <p:cNvPicPr>
+            <a:picLocks noChangeAspect="1"/>
+          </p:cNvPicPr>
+          <p:nvPr/>
+        </p:nvPicPr>
+        <p:blipFill>
+          <a:blip r:embed="rId2">
+            <a:extLst>
+              <a:ext uri="{28A0092B-C50C-407E-A947-70E740481C1C}">
+                <a14:useLocalDpi xmlns:a14="http://schemas.microsoft.com/office/drawing/2010/main" val="0"/>
+              </a:ext>
+            </a:extLst>
+          </a:blip>
+          <a:stretch>
+            <a:fillRect/>
+          </a:stretch>
+        </p:blipFill>
+        <p:spPr>
+          <a:xfrm>
+            <a:off x="2649510" y="3059219"/>
+            <a:ext cx="6892980" cy="3002216"/>
+          </a:xfrm>
+          <a:prstGeom prst="rect">
+            <a:avLst/>
+          </a:prstGeom>
+        </p:spPr>
+      </p:pic>
     </p:spTree>
     <p:extLst>
       <p:ext uri="{BB962C8B-B14F-4D97-AF65-F5344CB8AC3E}">
@@ -4077,7 +4259,7 @@
           <a:p>
             <a:r>
               <a:rPr lang="en-GB" dirty="0"/>
-              <a:t>Playlist Generation</a:t>
+              <a:t>Playlist Generation Methods</a:t>
             </a:r>
           </a:p>
         </p:txBody>
@@ -4100,10 +4282,59 @@
         </p:nvSpPr>
         <p:spPr/>
         <p:txBody>
-          <a:bodyPr/>
-          <a:lstStyle/>
-          <a:p>
-            <a:endParaRPr lang="en-GB"/>
+          <a:bodyPr>
+            <a:normAutofit/>
+          </a:bodyPr>
+          <a:lstStyle/>
+          <a:p>
+            <a:pPr marL="0" indent="0">
+              <a:buNone/>
+            </a:pPr>
+            <a:endParaRPr lang="en-GB" sz="1800" dirty="0"/>
+          </a:p>
+          <a:p>
+            <a:pPr>
+              <a:buFont typeface="Arial" panose="020B0604020202020204" pitchFamily="34" charset="0"/>
+              <a:buChar char="•"/>
+            </a:pPr>
+            <a:r>
+              <a:rPr lang="en-GB" sz="2800" dirty="0"/>
+              <a:t> 518D space</a:t>
+            </a:r>
+          </a:p>
+          <a:p>
+            <a:pPr>
+              <a:buFont typeface="Arial" panose="020B0604020202020204" pitchFamily="34" charset="0"/>
+              <a:buChar char="•"/>
+            </a:pPr>
+            <a:endParaRPr lang="en-GB" sz="2800" dirty="0"/>
+          </a:p>
+          <a:p>
+            <a:pPr>
+              <a:buFont typeface="Arial" panose="020B0604020202020204" pitchFamily="34" charset="0"/>
+              <a:buChar char="•"/>
+            </a:pPr>
+            <a:r>
+              <a:rPr lang="en-GB" sz="2800" dirty="0"/>
+              <a:t> 2D graph space</a:t>
+            </a:r>
+          </a:p>
+          <a:p>
+            <a:pPr>
+              <a:buFont typeface="Arial" panose="020B0604020202020204" pitchFamily="34" charset="0"/>
+              <a:buChar char="•"/>
+            </a:pPr>
+            <a:endParaRPr lang="en-GB" sz="2800" dirty="0"/>
+          </a:p>
+          <a:p>
+            <a:pPr>
+              <a:buFont typeface="Arial" panose="020B0604020202020204" pitchFamily="34" charset="0"/>
+              <a:buChar char="•"/>
+            </a:pPr>
+            <a:r>
+              <a:rPr lang="en-GB" sz="2800" dirty="0"/>
+              <a:t> Heat diffusion </a:t>
+            </a:r>
           </a:p>
         </p:txBody>
       </p:sp>
@@ -4160,7 +4391,7 @@
           <a:p>
             <a:r>
               <a:rPr lang="en-GB" dirty="0"/>
-              <a:t>518D features method</a:t>
+              <a:t>518D Features Distances</a:t>
             </a:r>
           </a:p>
         </p:txBody>
@@ -4181,12 +4412,66 @@
             <p:ph idx="1"/>
           </p:nvPr>
         </p:nvSpPr>
-        <p:spPr/>
-        <p:txBody>
-          <a:bodyPr/>
-          <a:lstStyle/>
-          <a:p>
-            <a:endParaRPr lang="en-GB"/>
+        <p:spPr>
+          <a:xfrm>
+            <a:off x="1097280" y="1737360"/>
+            <a:ext cx="10058400" cy="4188295"/>
+          </a:xfrm>
+        </p:spPr>
+        <p:txBody>
+          <a:bodyPr>
+            <a:normAutofit/>
+          </a:bodyPr>
+          <a:lstStyle/>
+          <a:p>
+            <a:pPr marL="0" indent="0">
+              <a:buNone/>
+            </a:pPr>
+            <a:endParaRPr lang="en-GB" dirty="0"/>
+          </a:p>
+          <a:p>
+            <a:pPr>
+              <a:buFont typeface="Arial" panose="020B0604020202020204" pitchFamily="34" charset="0"/>
+              <a:buChar char="•"/>
+            </a:pPr>
+            <a:r>
+              <a:rPr lang="en-GB" sz="2800" dirty="0"/>
+              <a:t> Same distances used to calculate the adjacency matrix</a:t>
+            </a:r>
+          </a:p>
+          <a:p>
+            <a:pPr>
+              <a:buFont typeface="Arial" panose="020B0604020202020204" pitchFamily="34" charset="0"/>
+              <a:buChar char="•"/>
+            </a:pPr>
+            <a:endParaRPr lang="en-GB" sz="2800" dirty="0"/>
+          </a:p>
+          <a:p>
+            <a:pPr>
+              <a:buFont typeface="Arial" panose="020B0604020202020204" pitchFamily="34" charset="0"/>
+              <a:buChar char="•"/>
+            </a:pPr>
+            <a:r>
+              <a:rPr lang="en-GB" sz="2800" dirty="0"/>
+              <a:t> Closest nodes from each given songs</a:t>
+            </a:r>
+          </a:p>
+          <a:p>
+            <a:pPr marL="0" indent="0">
+              <a:buNone/>
+            </a:pPr>
+            <a:endParaRPr lang="en-US" dirty="0"/>
+          </a:p>
+          <a:p>
+            <a:pPr>
+              <a:buFont typeface="Arial" panose="020B0604020202020204" pitchFamily="34" charset="0"/>
+              <a:buChar char="•"/>
+            </a:pPr>
+            <a:r>
+              <a:rPr lang="en-US" sz="2800" dirty="0"/>
+              <a:t> Expectation : similar features =&gt; rhythm, height of voice, tonality… adventurous in regards to genres</a:t>
+            </a:r>
+            <a:endParaRPr lang="en-GB" sz="2800" dirty="0"/>
           </a:p>
         </p:txBody>
       </p:sp>
@@ -4243,7 +4528,7 @@
           <a:p>
             <a:r>
               <a:rPr lang="en-GB" dirty="0"/>
-              <a:t>2D spring layout neighbour method</a:t>
+              <a:t>2D Spring Layout Graph</a:t>
             </a:r>
           </a:p>
         </p:txBody>
@@ -4264,12 +4549,66 @@
             <p:ph idx="1"/>
           </p:nvPr>
         </p:nvSpPr>
-        <p:spPr/>
-        <p:txBody>
-          <a:bodyPr/>
-          <a:lstStyle/>
-          <a:p>
-            <a:endParaRPr lang="en-GB"/>
+        <p:spPr>
+          <a:xfrm>
+            <a:off x="1097280" y="1737360"/>
+            <a:ext cx="10058400" cy="4023360"/>
+          </a:xfrm>
+        </p:spPr>
+        <p:txBody>
+          <a:bodyPr>
+            <a:normAutofit/>
+          </a:bodyPr>
+          <a:lstStyle/>
+          <a:p>
+            <a:pPr marL="0" indent="0">
+              <a:buNone/>
+            </a:pPr>
+            <a:endParaRPr lang="en-GB" dirty="0"/>
+          </a:p>
+          <a:p>
+            <a:pPr>
+              <a:buFont typeface="Arial" panose="020B0604020202020204" pitchFamily="34" charset="0"/>
+              <a:buChar char="•"/>
+            </a:pPr>
+            <a:r>
+              <a:rPr lang="en-GB" sz="2800" dirty="0"/>
+              <a:t> Euclidean distance between points in the 2D graph</a:t>
+            </a:r>
+          </a:p>
+          <a:p>
+            <a:pPr marL="0" indent="0">
+              <a:buNone/>
+            </a:pPr>
+            <a:endParaRPr lang="en-GB" sz="2800" dirty="0"/>
+          </a:p>
+          <a:p>
+            <a:pPr>
+              <a:buFont typeface="Arial" panose="020B0604020202020204" pitchFamily="34" charset="0"/>
+              <a:buChar char="•"/>
+            </a:pPr>
+            <a:r>
+              <a:rPr lang="en-US" sz="2800" dirty="0"/>
+              <a:t> </a:t>
+            </a:r>
+            <a:r>
+              <a:rPr lang="en-GB" sz="2800" dirty="0"/>
+              <a:t>Again, closest nodes from each given songs</a:t>
+            </a:r>
+          </a:p>
+          <a:p>
+            <a:endParaRPr lang="en-US" sz="2800" dirty="0"/>
+          </a:p>
+          <a:p>
+            <a:pPr>
+              <a:buFont typeface="Arial" panose="020B0604020202020204" pitchFamily="34" charset="0"/>
+              <a:buChar char="•"/>
+            </a:pPr>
+            <a:r>
+              <a:rPr lang="en-US" sz="2800" dirty="0"/>
+              <a:t> Expectation : very targeted towards a speciﬁc kind of song and genre</a:t>
+            </a:r>
+            <a:endParaRPr lang="en-GB" sz="2800" dirty="0"/>
           </a:p>
         </p:txBody>
       </p:sp>
@@ -4326,33 +4665,370 @@
           <a:p>
             <a:r>
               <a:rPr lang="en-GB" dirty="0"/>
-              <a:t>Heat diffusion method</a:t>
-            </a:r>
-          </a:p>
-        </p:txBody>
-      </p:sp>
-      <p:sp>
-        <p:nvSpPr>
-          <p:cNvPr id="3" name="Espace réservé du contenu 2">
+              <a:t>Heat Diffusion</a:t>
+            </a:r>
+          </a:p>
+        </p:txBody>
+      </p:sp>
+      <p:pic>
+        <p:nvPicPr>
+          <p:cNvPr id="5" name="Content Placeholder 4">
             <a:extLst>
               <a:ext uri="{FF2B5EF4-FFF2-40B4-BE49-F238E27FC236}">
-                <a16:creationId xmlns:a16="http://schemas.microsoft.com/office/drawing/2014/main" id="{C3FB5125-1577-4880-8DE2-8329852C206B}"/>
+                <a16:creationId xmlns:a16="http://schemas.microsoft.com/office/drawing/2014/main" id="{31E09A29-B920-4270-8568-8D93BA8C84C2}"/>
               </a:ext>
             </a:extLst>
           </p:cNvPr>
-          <p:cNvSpPr>
-            <a:spLocks noGrp="1"/>
-          </p:cNvSpPr>
+          <p:cNvPicPr>
+            <a:picLocks noGrp="1" noChangeAspect="1"/>
+          </p:cNvPicPr>
           <p:nvPr>
             <p:ph idx="1"/>
           </p:nvPr>
-        </p:nvSpPr>
-        <p:spPr/>
-        <p:txBody>
-          <a:bodyPr/>
-          <a:lstStyle/>
-          <a:p>
-            <a:endParaRPr lang="en-GB"/>
+        </p:nvPicPr>
+        <p:blipFill>
+          <a:blip r:embed="rId2">
+            <a:extLst>
+              <a:ext uri="{28A0092B-C50C-407E-A947-70E740481C1C}">
+                <a14:useLocalDpi xmlns:a14="http://schemas.microsoft.com/office/drawing/2010/main" val="0"/>
+              </a:ext>
+            </a:extLst>
+          </a:blip>
+          <a:stretch>
+            <a:fillRect/>
+          </a:stretch>
+        </p:blipFill>
+        <p:spPr>
+          <a:xfrm>
+            <a:off x="4581539" y="2022846"/>
+            <a:ext cx="7363545" cy="3906614"/>
+          </a:xfrm>
+        </p:spPr>
+      </p:pic>
+      <p:sp>
+        <p:nvSpPr>
+          <p:cNvPr id="9" name="Espace réservé du contenu 2">
+            <a:extLst>
+              <a:ext uri="{FF2B5EF4-FFF2-40B4-BE49-F238E27FC236}">
+                <a16:creationId xmlns:a16="http://schemas.microsoft.com/office/drawing/2014/main" id="{E79B18D4-096D-465F-AC4C-20371406CEBD}"/>
+              </a:ext>
+            </a:extLst>
+          </p:cNvPr>
+          <p:cNvSpPr txBox="1">
+            <a:spLocks/>
+          </p:cNvSpPr>
+          <p:nvPr/>
+        </p:nvSpPr>
+        <p:spPr>
+          <a:xfrm>
+            <a:off x="1097280" y="1737360"/>
+            <a:ext cx="3267330" cy="4192100"/>
+          </a:xfrm>
+          <a:prstGeom prst="rect">
+            <a:avLst/>
+          </a:prstGeom>
+        </p:spPr>
+        <p:txBody>
+          <a:bodyPr vert="horz" lIns="0" tIns="45720" rIns="0" bIns="45720" rtlCol="0">
+            <a:normAutofit lnSpcReduction="10000"/>
+          </a:bodyPr>
+          <a:lstStyle>
+            <a:lvl1pPr marL="91440" indent="-91440" algn="l" defTabSz="914400" rtl="0" eaLnBrk="1" latinLnBrk="0" hangingPunct="1">
+              <a:lnSpc>
+                <a:spcPct val="90000"/>
+              </a:lnSpc>
+              <a:spcBef>
+                <a:spcPts val="1200"/>
+              </a:spcBef>
+              <a:spcAft>
+                <a:spcPts val="200"/>
+              </a:spcAft>
+              <a:buClr>
+                <a:schemeClr val="accent1"/>
+              </a:buClr>
+              <a:buSzPct val="100000"/>
+              <a:buFont typeface="Calibri" panose="020F0502020204030204" pitchFamily="34" charset="0"/>
+              <a:buChar char=" "/>
+              <a:defRPr sz="2000" kern="1200">
+                <a:solidFill>
+                  <a:schemeClr val="tx1">
+                    <a:lumMod val="75000"/>
+                    <a:lumOff val="25000"/>
+                  </a:schemeClr>
+                </a:solidFill>
+                <a:latin typeface="+mn-lt"/>
+                <a:ea typeface="+mn-ea"/>
+                <a:cs typeface="+mn-cs"/>
+              </a:defRPr>
+            </a:lvl1pPr>
+            <a:lvl2pPr marL="384048" indent="-182880" algn="l" defTabSz="914400" rtl="0" eaLnBrk="1" latinLnBrk="0" hangingPunct="1">
+              <a:lnSpc>
+                <a:spcPct val="90000"/>
+              </a:lnSpc>
+              <a:spcBef>
+                <a:spcPts val="200"/>
+              </a:spcBef>
+              <a:spcAft>
+                <a:spcPts val="400"/>
+              </a:spcAft>
+              <a:buClr>
+                <a:schemeClr val="accent1"/>
+              </a:buClr>
+              <a:buFont typeface="Calibri" pitchFamily="34" charset="0"/>
+              <a:buChar char="◦"/>
+              <a:defRPr sz="1800" kern="1200">
+                <a:solidFill>
+                  <a:schemeClr val="tx1">
+                    <a:lumMod val="75000"/>
+                    <a:lumOff val="25000"/>
+                  </a:schemeClr>
+                </a:solidFill>
+                <a:latin typeface="+mn-lt"/>
+                <a:ea typeface="+mn-ea"/>
+                <a:cs typeface="+mn-cs"/>
+              </a:defRPr>
+            </a:lvl2pPr>
+            <a:lvl3pPr marL="566928" indent="-182880" algn="l" defTabSz="914400" rtl="0" eaLnBrk="1" latinLnBrk="0" hangingPunct="1">
+              <a:lnSpc>
+                <a:spcPct val="90000"/>
+              </a:lnSpc>
+              <a:spcBef>
+                <a:spcPts val="200"/>
+              </a:spcBef>
+              <a:spcAft>
+                <a:spcPts val="400"/>
+              </a:spcAft>
+              <a:buClr>
+                <a:schemeClr val="accent1"/>
+              </a:buClr>
+              <a:buFont typeface="Calibri" pitchFamily="34" charset="0"/>
+              <a:buChar char="◦"/>
+              <a:defRPr sz="1400" kern="1200">
+                <a:solidFill>
+                  <a:schemeClr val="tx1">
+                    <a:lumMod val="75000"/>
+                    <a:lumOff val="25000"/>
+                  </a:schemeClr>
+                </a:solidFill>
+                <a:latin typeface="+mn-lt"/>
+                <a:ea typeface="+mn-ea"/>
+                <a:cs typeface="+mn-cs"/>
+              </a:defRPr>
+            </a:lvl3pPr>
+            <a:lvl4pPr marL="749808" indent="-182880" algn="l" defTabSz="914400" rtl="0" eaLnBrk="1" latinLnBrk="0" hangingPunct="1">
+              <a:lnSpc>
+                <a:spcPct val="90000"/>
+              </a:lnSpc>
+              <a:spcBef>
+                <a:spcPts val="200"/>
+              </a:spcBef>
+              <a:spcAft>
+                <a:spcPts val="400"/>
+              </a:spcAft>
+              <a:buClr>
+                <a:schemeClr val="accent1"/>
+              </a:buClr>
+              <a:buFont typeface="Calibri" pitchFamily="34" charset="0"/>
+              <a:buChar char="◦"/>
+              <a:defRPr sz="1400" kern="1200">
+                <a:solidFill>
+                  <a:schemeClr val="tx1">
+                    <a:lumMod val="75000"/>
+                    <a:lumOff val="25000"/>
+                  </a:schemeClr>
+                </a:solidFill>
+                <a:latin typeface="+mn-lt"/>
+                <a:ea typeface="+mn-ea"/>
+                <a:cs typeface="+mn-cs"/>
+              </a:defRPr>
+            </a:lvl4pPr>
+            <a:lvl5pPr marL="932688" indent="-182880" algn="l" defTabSz="914400" rtl="0" eaLnBrk="1" latinLnBrk="0" hangingPunct="1">
+              <a:lnSpc>
+                <a:spcPct val="90000"/>
+              </a:lnSpc>
+              <a:spcBef>
+                <a:spcPts val="200"/>
+              </a:spcBef>
+              <a:spcAft>
+                <a:spcPts val="400"/>
+              </a:spcAft>
+              <a:buClr>
+                <a:schemeClr val="accent1"/>
+              </a:buClr>
+              <a:buFont typeface="Calibri" pitchFamily="34" charset="0"/>
+              <a:buChar char="◦"/>
+              <a:defRPr sz="1400" kern="1200">
+                <a:solidFill>
+                  <a:schemeClr val="tx1">
+                    <a:lumMod val="75000"/>
+                    <a:lumOff val="25000"/>
+                  </a:schemeClr>
+                </a:solidFill>
+                <a:latin typeface="+mn-lt"/>
+                <a:ea typeface="+mn-ea"/>
+                <a:cs typeface="+mn-cs"/>
+              </a:defRPr>
+            </a:lvl5pPr>
+            <a:lvl6pPr marL="1100000" indent="-228600" algn="l" defTabSz="914400" rtl="0" eaLnBrk="1" latinLnBrk="0" hangingPunct="1">
+              <a:lnSpc>
+                <a:spcPct val="90000"/>
+              </a:lnSpc>
+              <a:spcBef>
+                <a:spcPts val="200"/>
+              </a:spcBef>
+              <a:spcAft>
+                <a:spcPts val="400"/>
+              </a:spcAft>
+              <a:buClr>
+                <a:schemeClr val="accent1"/>
+              </a:buClr>
+              <a:buFont typeface="Calibri" pitchFamily="34" charset="0"/>
+              <a:buChar char="◦"/>
+              <a:defRPr sz="1400" kern="1200">
+                <a:solidFill>
+                  <a:schemeClr val="tx1">
+                    <a:lumMod val="75000"/>
+                    <a:lumOff val="25000"/>
+                  </a:schemeClr>
+                </a:solidFill>
+                <a:latin typeface="+mn-lt"/>
+                <a:ea typeface="+mn-ea"/>
+                <a:cs typeface="+mn-cs"/>
+              </a:defRPr>
+            </a:lvl6pPr>
+            <a:lvl7pPr marL="1300000" indent="-228600" algn="l" defTabSz="914400" rtl="0" eaLnBrk="1" latinLnBrk="0" hangingPunct="1">
+              <a:lnSpc>
+                <a:spcPct val="90000"/>
+              </a:lnSpc>
+              <a:spcBef>
+                <a:spcPts val="200"/>
+              </a:spcBef>
+              <a:spcAft>
+                <a:spcPts val="400"/>
+              </a:spcAft>
+              <a:buClr>
+                <a:schemeClr val="accent1"/>
+              </a:buClr>
+              <a:buFont typeface="Calibri" pitchFamily="34" charset="0"/>
+              <a:buChar char="◦"/>
+              <a:defRPr sz="1400" kern="1200">
+                <a:solidFill>
+                  <a:schemeClr val="tx1">
+                    <a:lumMod val="75000"/>
+                    <a:lumOff val="25000"/>
+                  </a:schemeClr>
+                </a:solidFill>
+                <a:latin typeface="+mn-lt"/>
+                <a:ea typeface="+mn-ea"/>
+                <a:cs typeface="+mn-cs"/>
+              </a:defRPr>
+            </a:lvl7pPr>
+            <a:lvl8pPr marL="1500000" indent="-228600" algn="l" defTabSz="914400" rtl="0" eaLnBrk="1" latinLnBrk="0" hangingPunct="1">
+              <a:lnSpc>
+                <a:spcPct val="90000"/>
+              </a:lnSpc>
+              <a:spcBef>
+                <a:spcPts val="200"/>
+              </a:spcBef>
+              <a:spcAft>
+                <a:spcPts val="400"/>
+              </a:spcAft>
+              <a:buClr>
+                <a:schemeClr val="accent1"/>
+              </a:buClr>
+              <a:buFont typeface="Calibri" pitchFamily="34" charset="0"/>
+              <a:buChar char="◦"/>
+              <a:defRPr sz="1400" kern="1200">
+                <a:solidFill>
+                  <a:schemeClr val="tx1">
+                    <a:lumMod val="75000"/>
+                    <a:lumOff val="25000"/>
+                  </a:schemeClr>
+                </a:solidFill>
+                <a:latin typeface="+mn-lt"/>
+                <a:ea typeface="+mn-ea"/>
+                <a:cs typeface="+mn-cs"/>
+              </a:defRPr>
+            </a:lvl8pPr>
+            <a:lvl9pPr marL="1700000" indent="-228600" algn="l" defTabSz="914400" rtl="0" eaLnBrk="1" latinLnBrk="0" hangingPunct="1">
+              <a:lnSpc>
+                <a:spcPct val="90000"/>
+              </a:lnSpc>
+              <a:spcBef>
+                <a:spcPts val="200"/>
+              </a:spcBef>
+              <a:spcAft>
+                <a:spcPts val="400"/>
+              </a:spcAft>
+              <a:buClr>
+                <a:schemeClr val="accent1"/>
+              </a:buClr>
+              <a:buFont typeface="Calibri" pitchFamily="34" charset="0"/>
+              <a:buChar char="◦"/>
+              <a:defRPr sz="1400" kern="1200">
+                <a:solidFill>
+                  <a:schemeClr val="tx1">
+                    <a:lumMod val="75000"/>
+                    <a:lumOff val="25000"/>
+                  </a:schemeClr>
+                </a:solidFill>
+                <a:latin typeface="+mn-lt"/>
+                <a:ea typeface="+mn-ea"/>
+                <a:cs typeface="+mn-cs"/>
+              </a:defRPr>
+            </a:lvl9pPr>
+          </a:lstStyle>
+          <a:p>
+            <a:pPr marL="0" indent="0">
+              <a:buFont typeface="Calibri" panose="020F0502020204030204" pitchFamily="34" charset="0"/>
+              <a:buNone/>
+            </a:pPr>
+            <a:endParaRPr lang="en-GB" dirty="0"/>
+          </a:p>
+          <a:p>
+            <a:pPr marL="457200" indent="-457200">
+              <a:buFont typeface="Arial" panose="020B0604020202020204" pitchFamily="34" charset="0"/>
+              <a:buChar char="•"/>
+            </a:pPr>
+            <a:r>
+              <a:rPr lang="en-GB" sz="2800" dirty="0"/>
+              <a:t>Diffusion </a:t>
+            </a:r>
+            <a:r>
+              <a:rPr lang="en-US" sz="2800" dirty="0"/>
+              <a:t>from each starting node </a:t>
+            </a:r>
+          </a:p>
+          <a:p>
+            <a:pPr marL="457200" indent="-457200">
+              <a:buFont typeface="Arial" panose="020B0604020202020204" pitchFamily="34" charset="0"/>
+              <a:buChar char="•"/>
+            </a:pPr>
+            <a:r>
+              <a:rPr lang="en-US" sz="2800" dirty="0"/>
+              <a:t>Averaging between all contributions</a:t>
+            </a:r>
+          </a:p>
+          <a:p>
+            <a:pPr marL="457200" indent="-457200">
+              <a:buFont typeface="Arial" panose="020B0604020202020204" pitchFamily="34" charset="0"/>
+              <a:buChar char="•"/>
+            </a:pPr>
+            <a:r>
+              <a:rPr lang="en-US" sz="2800" dirty="0"/>
+              <a:t>“Hottest” nodes</a:t>
+            </a:r>
+          </a:p>
+          <a:p>
+            <a:pPr marL="457200" indent="-457200">
+              <a:buFont typeface="Arial" panose="020B0604020202020204" pitchFamily="34" charset="0"/>
+              <a:buChar char="•"/>
+            </a:pPr>
+            <a:r>
+              <a:rPr lang="en-US" sz="2800" dirty="0"/>
+              <a:t>Expectation : fusion between every given songs properties</a:t>
+            </a:r>
+            <a:endParaRPr lang="en-CA" sz="2800" dirty="0"/>
           </a:p>
         </p:txBody>
       </p:sp>
@@ -4409,7 +5085,7 @@
           <a:p>
             <a:r>
               <a:rPr lang="en-GB" dirty="0"/>
-              <a:t>Conclusion</a:t>
+              <a:t>Conclusion and Demo</a:t>
             </a:r>
           </a:p>
         </p:txBody>
@@ -4430,12 +5106,124 @@
             <p:ph idx="1"/>
           </p:nvPr>
         </p:nvSpPr>
-        <p:spPr/>
+        <p:spPr>
+          <a:xfrm>
+            <a:off x="1097280" y="2043697"/>
+            <a:ext cx="10058400" cy="4023360"/>
+          </a:xfrm>
+        </p:spPr>
         <p:txBody>
           <a:bodyPr/>
           <a:lstStyle/>
           <a:p>
-            <a:endParaRPr lang="en-GB"/>
+            <a:pPr>
+              <a:buFont typeface="Arial" panose="020B0604020202020204" pitchFamily="34" charset="0"/>
+              <a:buChar char="•"/>
+            </a:pPr>
+            <a:r>
+              <a:rPr lang="en-GB" sz="2800" dirty="0"/>
+              <a:t> Good separation of genres in 2D</a:t>
+            </a:r>
+          </a:p>
+          <a:p>
+            <a:pPr>
+              <a:buFont typeface="Arial" panose="020B0604020202020204" pitchFamily="34" charset="0"/>
+              <a:buChar char="•"/>
+            </a:pPr>
+            <a:r>
+              <a:rPr lang="en-GB" sz="2800" dirty="0"/>
+              <a:t> Close performance of different generation methods</a:t>
+            </a:r>
+          </a:p>
+          <a:p>
+            <a:pPr>
+              <a:buFont typeface="Arial" panose="020B0604020202020204" pitchFamily="34" charset="0"/>
+              <a:buChar char="•"/>
+            </a:pPr>
+            <a:r>
+              <a:rPr lang="en-GB" sz="2800" dirty="0"/>
+              <a:t> Music is a subjective experience, make yourself an opinion !</a:t>
+            </a:r>
+          </a:p>
+        </p:txBody>
+      </p:sp>
+      <p:sp>
+        <p:nvSpPr>
+          <p:cNvPr id="6" name="TextBox 5">
+            <a:extLst>
+              <a:ext uri="{FF2B5EF4-FFF2-40B4-BE49-F238E27FC236}">
+                <a16:creationId xmlns:a16="http://schemas.microsoft.com/office/drawing/2014/main" id="{F10A3C8B-E2EC-45FF-AC67-D84C3C48E75E}"/>
+              </a:ext>
+            </a:extLst>
+          </p:cNvPr>
+          <p:cNvSpPr txBox="1"/>
+          <p:nvPr/>
+        </p:nvSpPr>
+        <p:spPr>
+          <a:xfrm>
+            <a:off x="1225484" y="3850884"/>
+            <a:ext cx="2130457" cy="369332"/>
+          </a:xfrm>
+          <a:prstGeom prst="rect">
+            <a:avLst/>
+          </a:prstGeom>
+          <a:noFill/>
+        </p:spPr>
+        <p:txBody>
+          <a:bodyPr wrap="square" rtlCol="0">
+            <a:spAutoFit/>
+          </a:bodyPr>
+          <a:lstStyle/>
+          <a:p>
+            <a:r>
+              <a:rPr lang="en-CA" dirty="0"/>
+              <a:t>Input </a:t>
+            </a:r>
+            <a:r>
+              <a:rPr lang="en-CA" dirty="0" err="1"/>
+              <a:t>musics</a:t>
+            </a:r>
+            <a:endParaRPr lang="en-CA" dirty="0"/>
+          </a:p>
+        </p:txBody>
+      </p:sp>
+      <p:sp>
+        <p:nvSpPr>
+          <p:cNvPr id="7" name="TextBox 6">
+            <a:extLst>
+              <a:ext uri="{FF2B5EF4-FFF2-40B4-BE49-F238E27FC236}">
+                <a16:creationId xmlns:a16="http://schemas.microsoft.com/office/drawing/2014/main" id="{74A344A4-B186-457D-AC2F-D715788542E5}"/>
+              </a:ext>
+            </a:extLst>
+          </p:cNvPr>
+          <p:cNvSpPr txBox="1"/>
+          <p:nvPr/>
+        </p:nvSpPr>
+        <p:spPr>
+          <a:xfrm>
+            <a:off x="4600281" y="3850884"/>
+            <a:ext cx="4857950" cy="369332"/>
+          </a:xfrm>
+          <a:prstGeom prst="rect">
+            <a:avLst/>
+          </a:prstGeom>
+          <a:noFill/>
+        </p:spPr>
+        <p:txBody>
+          <a:bodyPr wrap="square" rtlCol="0">
+            <a:spAutoFit/>
+          </a:bodyPr>
+          <a:lstStyle/>
+          <a:p>
+            <a:r>
+              <a:rPr lang="en-CA" dirty="0"/>
+              <a:t>Output </a:t>
+            </a:r>
+            <a:r>
+              <a:rPr lang="en-CA" dirty="0" err="1"/>
+              <a:t>musics</a:t>
+            </a:r>
+            <a:endParaRPr lang="en-CA" dirty="0"/>
           </a:p>
         </p:txBody>
       </p:sp>

</xml_diff>